<commit_message>
just have pptx and pdf versions, and updates to the learning chapter
</commit_message>
<xml_diff>
--- a/ccn/randy_slides/oreilly_ccn_brainareas.pptx
+++ b/ccn/randy_slides/oreilly_ccn_brainareas.pptx
@@ -5,10 +5,10 @@
     <p:sldMasterId id="2147483660" r:id="rId1"/>
   </p:sldMasterIdLst>
   <p:notesMasterIdLst>
-    <p:notesMasterId r:id="rId17"/>
+    <p:notesMasterId r:id="rId19"/>
   </p:notesMasterIdLst>
   <p:handoutMasterIdLst>
-    <p:handoutMasterId r:id="rId18"/>
+    <p:handoutMasterId r:id="rId20"/>
   </p:handoutMasterIdLst>
   <p:sldIdLst>
     <p:sldId id="341" r:id="rId2"/>
@@ -26,6 +26,8 @@
     <p:sldId id="351" r:id="rId14"/>
     <p:sldId id="353" r:id="rId15"/>
     <p:sldId id="352" r:id="rId16"/>
+    <p:sldId id="312" r:id="rId17"/>
+    <p:sldId id="313" r:id="rId18"/>
   </p:sldIdLst>
   <p:sldSz cx="9144000" cy="6858000" type="screen4x3"/>
   <p:notesSz cx="6858000" cy="9144000"/>
@@ -226,7 +228,7 @@
             <a:fld id="{134E0E46-09FB-E94F-B740-AE4D5C6FE5DD}" type="datetimeFigureOut">
               <a:rPr lang="en-US" smtClean="0"/>
               <a:pPr/>
-              <a:t>2/19/19</a:t>
+              <a:t>4/14/20</a:t>
             </a:fld>
             <a:endParaRPr lang="en-US"/>
           </a:p>
@@ -394,7 +396,7 @@
             <a:fld id="{A39D9CCF-58B7-6C4F-9057-0B7282734A9C}" type="datetimeFigureOut">
               <a:rPr lang="en-US" smtClean="0"/>
               <a:pPr/>
-              <a:t>2/19/19</a:t>
+              <a:t>4/14/20</a:t>
             </a:fld>
             <a:endParaRPr lang="en-US"/>
           </a:p>
@@ -867,6 +869,91 @@
 </p:notes>
 </file>
 
+<file path=ppt/notesSlides/notesSlide3.xml><?xml version="1.0" encoding="utf-8"?>
+<p:notes xmlns:a="http://schemas.openxmlformats.org/drawingml/2006/main" xmlns:r="http://schemas.openxmlformats.org/officeDocument/2006/relationships" xmlns:p="http://schemas.openxmlformats.org/presentationml/2006/main">
+  <p:cSld>
+    <p:spTree>
+      <p:nvGrpSpPr>
+        <p:cNvPr id="1" name=""/>
+        <p:cNvGrpSpPr/>
+        <p:nvPr/>
+      </p:nvGrpSpPr>
+      <p:grpSpPr>
+        <a:xfrm>
+          <a:off x="0" y="0"/>
+          <a:ext cx="0" cy="0"/>
+          <a:chOff x="0" y="0"/>
+          <a:chExt cx="0" cy="0"/>
+        </a:xfrm>
+      </p:grpSpPr>
+      <p:sp>
+        <p:nvSpPr>
+          <p:cNvPr id="2" name="Slide Image Placeholder 1"/>
+          <p:cNvSpPr>
+            <a:spLocks noGrp="1" noRot="1" noChangeAspect="1"/>
+          </p:cNvSpPr>
+          <p:nvPr>
+            <p:ph type="sldImg"/>
+          </p:nvPr>
+        </p:nvSpPr>
+        <p:spPr/>
+      </p:sp>
+      <p:sp>
+        <p:nvSpPr>
+          <p:cNvPr id="3" name="Notes Placeholder 2"/>
+          <p:cNvSpPr>
+            <a:spLocks noGrp="1"/>
+          </p:cNvSpPr>
+          <p:nvPr>
+            <p:ph type="body" idx="1"/>
+          </p:nvPr>
+        </p:nvSpPr>
+        <p:spPr/>
+        <p:txBody>
+          <a:bodyPr/>
+          <a:lstStyle/>
+          <a:p>
+            <a:endParaRPr lang="en-US" dirty="0"/>
+          </a:p>
+        </p:txBody>
+      </p:sp>
+      <p:sp>
+        <p:nvSpPr>
+          <p:cNvPr id="4" name="Slide Number Placeholder 3"/>
+          <p:cNvSpPr>
+            <a:spLocks noGrp="1"/>
+          </p:cNvSpPr>
+          <p:nvPr>
+            <p:ph type="sldNum" sz="quarter" idx="5"/>
+          </p:nvPr>
+        </p:nvSpPr>
+        <p:spPr/>
+        <p:txBody>
+          <a:bodyPr/>
+          <a:lstStyle/>
+          <a:p>
+            <a:fld id="{EF5F784C-09B2-C64B-B8B7-C89AD37B13C0}" type="slidenum">
+              <a:rPr lang="en-US" smtClean="0"/>
+              <a:pPr/>
+              <a:t>16</a:t>
+            </a:fld>
+            <a:endParaRPr lang="en-US"/>
+          </a:p>
+        </p:txBody>
+      </p:sp>
+    </p:spTree>
+    <p:extLst>
+      <p:ext uri="{BB962C8B-B14F-4D97-AF65-F5344CB8AC3E}">
+        <p14:creationId xmlns:p14="http://schemas.microsoft.com/office/powerpoint/2010/main" val="1847123202"/>
+      </p:ext>
+    </p:extLst>
+  </p:cSld>
+  <p:clrMapOvr>
+    <a:masterClrMapping/>
+  </p:clrMapOvr>
+</p:notes>
+</file>
+
 <file path=ppt/slideLayouts/slideLayout1.xml><?xml version="1.0" encoding="utf-8"?>
 <p:sldLayout xmlns:a="http://schemas.openxmlformats.org/drawingml/2006/main" xmlns:r="http://schemas.openxmlformats.org/officeDocument/2006/relationships" xmlns:p="http://schemas.openxmlformats.org/presentationml/2006/main" type="title" preserve="1">
   <p:cSld name="Title Slide">
@@ -997,7 +1084,7 @@
             <a:fld id="{0F43610C-CF0F-A341-95E3-9AC2B6738F38}" type="datetime1">
               <a:rPr lang="en-US" smtClean="0"/>
               <a:pPr/>
-              <a:t>2/19/19</a:t>
+              <a:t>4/14/20</a:t>
             </a:fld>
             <a:endParaRPr lang="en-US"/>
           </a:p>
@@ -1174,7 +1261,7 @@
             <a:fld id="{80722BD1-6F2E-954E-9666-DACFAE059D87}" type="datetime1">
               <a:rPr lang="en-US" smtClean="0"/>
               <a:pPr/>
-              <a:t>2/19/19</a:t>
+              <a:t>4/14/20</a:t>
             </a:fld>
             <a:endParaRPr lang="en-US"/>
           </a:p>
@@ -1361,7 +1448,7 @@
             <a:fld id="{81719E71-40F5-594A-A597-B9A1F7A8E2A0}" type="datetime1">
               <a:rPr lang="en-US" smtClean="0"/>
               <a:pPr/>
-              <a:t>2/19/19</a:t>
+              <a:t>4/14/20</a:t>
             </a:fld>
             <a:endParaRPr lang="en-US"/>
           </a:p>
@@ -1538,7 +1625,7 @@
             <a:fld id="{80E7870B-B594-BE4F-883F-5AA3BF0E980A}" type="datetime1">
               <a:rPr lang="en-US" smtClean="0"/>
               <a:pPr/>
-              <a:t>2/19/19</a:t>
+              <a:t>4/14/20</a:t>
             </a:fld>
             <a:endParaRPr lang="en-US"/>
           </a:p>
@@ -1738,7 +1825,7 @@
             <a:fld id="{4001173A-C22D-A545-AA98-51D0B584A64A}" type="datetime1">
               <a:rPr lang="en-US" smtClean="0"/>
               <a:pPr/>
-              <a:t>2/19/19</a:t>
+              <a:t>4/14/20</a:t>
             </a:fld>
             <a:endParaRPr lang="en-US"/>
           </a:p>
@@ -2032,7 +2119,7 @@
             <a:fld id="{8627B750-1BB8-F846-854F-817BE719E813}" type="datetime1">
               <a:rPr lang="en-US" smtClean="0"/>
               <a:pPr/>
-              <a:t>2/19/19</a:t>
+              <a:t>4/14/20</a:t>
             </a:fld>
             <a:endParaRPr lang="en-US"/>
           </a:p>
@@ -2465,7 +2552,7 @@
             <a:fld id="{A24BBA21-B6FA-C24E-9759-3735F7DAA052}" type="datetime1">
               <a:rPr lang="en-US" smtClean="0"/>
               <a:pPr/>
-              <a:t>2/19/19</a:t>
+              <a:t>4/14/20</a:t>
             </a:fld>
             <a:endParaRPr lang="en-US"/>
           </a:p>
@@ -2591,7 +2678,7 @@
             <a:fld id="{A208DD61-016E-E544-8D0E-6C417EB34521}" type="datetime1">
               <a:rPr lang="en-US" smtClean="0"/>
               <a:pPr/>
-              <a:t>2/19/19</a:t>
+              <a:t>4/14/20</a:t>
             </a:fld>
             <a:endParaRPr lang="en-US"/>
           </a:p>
@@ -2695,7 +2782,7 @@
             <a:fld id="{60D8413E-DCA1-2346-AF80-5D4D797103C0}" type="datetime1">
               <a:rPr lang="en-US" smtClean="0"/>
               <a:pPr/>
-              <a:t>2/19/19</a:t>
+              <a:t>4/14/20</a:t>
             </a:fld>
             <a:endParaRPr lang="en-US"/>
           </a:p>
@@ -2979,7 +3066,7 @@
             <a:fld id="{51AF361F-D5BC-E048-9595-281C5881E6B3}" type="datetime1">
               <a:rPr lang="en-US" smtClean="0"/>
               <a:pPr/>
-              <a:t>2/19/19</a:t>
+              <a:t>4/14/20</a:t>
             </a:fld>
             <a:endParaRPr lang="en-US"/>
           </a:p>
@@ -3243,7 +3330,7 @@
             <a:fld id="{C8332548-F664-E64B-966D-816A33A80B57}" type="datetime1">
               <a:rPr lang="en-US" smtClean="0"/>
               <a:pPr/>
-              <a:t>2/19/19</a:t>
+              <a:t>4/14/20</a:t>
             </a:fld>
             <a:endParaRPr lang="en-US"/>
           </a:p>
@@ -3508,7 +3595,7 @@
             <a:fld id="{97796E05-5980-E044-9A8E-0F7500585CCE}" type="datetime1">
               <a:rPr lang="en-US" smtClean="0"/>
               <a:pPr/>
-              <a:t>2/19/19</a:t>
+              <a:t>4/14/20</a:t>
             </a:fld>
             <a:endParaRPr lang="en-US"/>
           </a:p>
@@ -5829,6 +5916,273 @@
     <p:extLst>
       <p:ext uri="{BB962C8B-B14F-4D97-AF65-F5344CB8AC3E}">
         <p14:creationId xmlns:p14="http://schemas.microsoft.com/office/powerpoint/2010/main" val="1020500548"/>
+      </p:ext>
+    </p:extLst>
+  </p:cSld>
+  <p:clrMapOvr>
+    <a:masterClrMapping/>
+  </p:clrMapOvr>
+</p:sld>
+</file>
+
+<file path=ppt/slides/slide16.xml><?xml version="1.0" encoding="utf-8"?>
+<p:sld xmlns:a="http://schemas.openxmlformats.org/drawingml/2006/main" xmlns:r="http://schemas.openxmlformats.org/officeDocument/2006/relationships" xmlns:p="http://schemas.openxmlformats.org/presentationml/2006/main">
+  <p:cSld>
+    <p:spTree>
+      <p:nvGrpSpPr>
+        <p:cNvPr id="1" name=""/>
+        <p:cNvGrpSpPr/>
+        <p:nvPr/>
+      </p:nvGrpSpPr>
+      <p:grpSpPr>
+        <a:xfrm>
+          <a:off x="0" y="0"/>
+          <a:ext cx="0" cy="0"/>
+          <a:chOff x="0" y="0"/>
+          <a:chExt cx="0" cy="0"/>
+        </a:xfrm>
+      </p:grpSpPr>
+      <p:sp>
+        <p:nvSpPr>
+          <p:cNvPr id="2" name="Title 1"/>
+          <p:cNvSpPr>
+            <a:spLocks noGrp="1"/>
+          </p:cNvSpPr>
+          <p:nvPr>
+            <p:ph type="title"/>
+          </p:nvPr>
+        </p:nvSpPr>
+        <p:spPr/>
+        <p:txBody>
+          <a:bodyPr/>
+          <a:lstStyle/>
+          <a:p>
+            <a:r>
+              <a:rPr lang="en-US" dirty="0"/>
+              <a:t>Neurotransmitter Terms</a:t>
+            </a:r>
+          </a:p>
+        </p:txBody>
+      </p:sp>
+      <p:sp>
+        <p:nvSpPr>
+          <p:cNvPr id="3" name="Content Placeholder 2"/>
+          <p:cNvSpPr>
+            <a:spLocks noGrp="1"/>
+          </p:cNvSpPr>
+          <p:nvPr>
+            <p:ph idx="1"/>
+          </p:nvPr>
+        </p:nvSpPr>
+        <p:spPr/>
+        <p:txBody>
+          <a:bodyPr/>
+          <a:lstStyle/>
+          <a:p>
+            <a:r>
+              <a:rPr lang="en-US" b="1"/>
+              <a:t>Agonist:</a:t>
+            </a:r>
+            <a:r>
+              <a:rPr lang="en-US"/>
+              <a:t> </a:t>
+            </a:r>
+            <a:r>
+              <a:rPr lang="en-US" dirty="0"/>
+              <a:t>acts like a given neurotransmitter</a:t>
+            </a:r>
+          </a:p>
+          <a:p>
+            <a:r>
+              <a:rPr lang="en-US" b="1" dirty="0"/>
+              <a:t>Antagonist:</a:t>
+            </a:r>
+            <a:r>
+              <a:rPr lang="en-US" dirty="0"/>
+              <a:t> blocks receptors for given NT</a:t>
+            </a:r>
+          </a:p>
+          <a:p>
+            <a:r>
+              <a:rPr lang="en-US" b="1" dirty="0"/>
+              <a:t>Reuptake:</a:t>
+            </a:r>
+            <a:r>
+              <a:rPr lang="en-US" dirty="0"/>
+              <a:t> takes NT back out of synapse</a:t>
+            </a:r>
+          </a:p>
+          <a:p>
+            <a:r>
+              <a:rPr lang="en-US" b="1" dirty="0"/>
+              <a:t>Neuromodulator:</a:t>
+            </a:r>
+            <a:r>
+              <a:rPr lang="en-US" dirty="0"/>
+              <a:t> a broadly-released neurotransmitter that has widespread modulatory effects on the brain</a:t>
+            </a:r>
+          </a:p>
+        </p:txBody>
+      </p:sp>
+    </p:spTree>
+    <p:extLst>
+      <p:ext uri="{BB962C8B-B14F-4D97-AF65-F5344CB8AC3E}">
+        <p14:creationId xmlns:p14="http://schemas.microsoft.com/office/powerpoint/2010/main" val="3798636960"/>
+      </p:ext>
+    </p:extLst>
+  </p:cSld>
+  <p:clrMapOvr>
+    <a:masterClrMapping/>
+  </p:clrMapOvr>
+</p:sld>
+</file>
+
+<file path=ppt/slides/slide17.xml><?xml version="1.0" encoding="utf-8"?>
+<p:sld xmlns:a="http://schemas.openxmlformats.org/drawingml/2006/main" xmlns:r="http://schemas.openxmlformats.org/officeDocument/2006/relationships" xmlns:p="http://schemas.openxmlformats.org/presentationml/2006/main">
+  <p:cSld>
+    <p:spTree>
+      <p:nvGrpSpPr>
+        <p:cNvPr id="1" name=""/>
+        <p:cNvGrpSpPr/>
+        <p:nvPr/>
+      </p:nvGrpSpPr>
+      <p:grpSpPr>
+        <a:xfrm>
+          <a:off x="0" y="0"/>
+          <a:ext cx="0" cy="0"/>
+          <a:chOff x="0" y="0"/>
+          <a:chExt cx="0" cy="0"/>
+        </a:xfrm>
+      </p:grpSpPr>
+      <p:sp>
+        <p:nvSpPr>
+          <p:cNvPr id="2" name="Title 1"/>
+          <p:cNvSpPr>
+            <a:spLocks noGrp="1"/>
+          </p:cNvSpPr>
+          <p:nvPr>
+            <p:ph type="title"/>
+          </p:nvPr>
+        </p:nvSpPr>
+        <p:spPr/>
+        <p:txBody>
+          <a:bodyPr/>
+          <a:lstStyle/>
+          <a:p>
+            <a:r>
+              <a:rPr lang="en-US" dirty="0"/>
+              <a:t>Neuromodulators and Drugs</a:t>
+            </a:r>
+            <a:br>
+              <a:rPr lang="en-US" dirty="0"/>
+            </a:br>
+            <a:r>
+              <a:rPr lang="en-US" i="1" dirty="0"/>
+              <a:t>(receptor agonists)</a:t>
+            </a:r>
+          </a:p>
+        </p:txBody>
+      </p:sp>
+      <p:sp>
+        <p:nvSpPr>
+          <p:cNvPr id="3" name="Content Placeholder 2"/>
+          <p:cNvSpPr>
+            <a:spLocks noGrp="1"/>
+          </p:cNvSpPr>
+          <p:nvPr>
+            <p:ph idx="1"/>
+          </p:nvPr>
+        </p:nvSpPr>
+        <p:spPr/>
+        <p:txBody>
+          <a:bodyPr/>
+          <a:lstStyle/>
+          <a:p>
+            <a:r>
+              <a:rPr lang="en-US" sz="2539" b="1" dirty="0"/>
+              <a:t>Acetylcholine (</a:t>
+            </a:r>
+            <a:r>
+              <a:rPr lang="en-US" sz="2539" b="1" dirty="0" err="1"/>
+              <a:t>ACh</a:t>
+            </a:r>
+            <a:r>
+              <a:rPr lang="en-US" sz="2539" b="1" dirty="0"/>
+              <a:t>)</a:t>
+            </a:r>
+            <a:r>
+              <a:rPr lang="en-US" sz="2539" dirty="0"/>
+              <a:t>: muscles, attention, learning, memory (nicotine)</a:t>
+            </a:r>
+          </a:p>
+          <a:p>
+            <a:r>
+              <a:rPr lang="en-US" sz="2539" b="1" dirty="0"/>
+              <a:t>Dopamine (DA):</a:t>
+            </a:r>
+            <a:r>
+              <a:rPr lang="en-US" sz="2539" dirty="0"/>
+              <a:t> when to learn, based on reward prediction errors (cocaine)</a:t>
+            </a:r>
+          </a:p>
+          <a:p>
+            <a:r>
+              <a:rPr lang="en-US" sz="2539" b="1" dirty="0" err="1"/>
+              <a:t>Norephinephrine</a:t>
+            </a:r>
+            <a:r>
+              <a:rPr lang="en-US" sz="2539" b="1" dirty="0"/>
+              <a:t> (NE):</a:t>
+            </a:r>
+            <a:r>
+              <a:rPr lang="en-US" sz="2539" dirty="0"/>
+              <a:t> attention, engagement (speed)</a:t>
+            </a:r>
+          </a:p>
+          <a:p>
+            <a:r>
+              <a:rPr lang="en-US" sz="2539" b="1" dirty="0"/>
+              <a:t>Serotonin (5HT)</a:t>
+            </a:r>
+            <a:r>
+              <a:rPr lang="en-US" sz="2539" dirty="0"/>
+              <a:t>: Mood, sleep, appetite, sex, stress (SSRI, LSD = waking dream)</a:t>
+            </a:r>
+          </a:p>
+          <a:p>
+            <a:r>
+              <a:rPr lang="en-US" sz="2539" b="1" dirty="0"/>
+              <a:t>Oxytocin</a:t>
+            </a:r>
+            <a:r>
+              <a:rPr lang="en-US" sz="2539" dirty="0"/>
+              <a:t>: social modulation, labor (</a:t>
+            </a:r>
+            <a:r>
+              <a:rPr lang="en-US" sz="2539" dirty="0" err="1"/>
+              <a:t>pitocin</a:t>
+            </a:r>
+            <a:r>
+              <a:rPr lang="en-US" sz="2539" dirty="0"/>
+              <a:t>)</a:t>
+            </a:r>
+          </a:p>
+          <a:p>
+            <a:r>
+              <a:rPr lang="en-US" sz="2539" b="1" dirty="0"/>
+              <a:t>Endorphins, Substance P</a:t>
+            </a:r>
+            <a:r>
+              <a:rPr lang="en-US" sz="2539" dirty="0"/>
+              <a:t>: pain (heroin)</a:t>
+            </a:r>
+          </a:p>
+        </p:txBody>
+      </p:sp>
+    </p:spTree>
+    <p:extLst>
+      <p:ext uri="{BB962C8B-B14F-4D97-AF65-F5344CB8AC3E}">
+        <p14:creationId xmlns:p14="http://schemas.microsoft.com/office/powerpoint/2010/main" val="2503793344"/>
       </p:ext>
     </p:extLst>
   </p:cSld>

</xml_diff>